<commit_message>
modifica relazione dettaglio percorso
</commit_message>
<xml_diff>
--- a/mockup/OUTDOORROMAGNA.pptx
+++ b/mockup/OUTDOORROMAGNA.pptx
@@ -6616,8 +6616,8 @@
         </p:blipFill>
         <p:spPr>
           <a:xfrm>
-            <a:off x="9164923" y="0"/>
-            <a:ext cx="3086100" cy="6858000"/>
+            <a:off x="9164923" y="-1"/>
+            <a:ext cx="3086100" cy="6882165"/>
           </a:xfrm>
           <a:prstGeom prst="rect">
             <a:avLst/>
@@ -6661,10 +6661,10 @@
       </p:pic>
       <p:pic>
         <p:nvPicPr>
-          <p:cNvPr id="8" name="Segnaposto contenuto 7" descr="Immagine che contiene testo, schermata, Carattere, diagramma&#10;&#10;Descrizione generata automaticamente">
-            <a:extLst>
-              <a:ext uri="{FF2B5EF4-FFF2-40B4-BE49-F238E27FC236}">
-                <a16:creationId xmlns:a16="http://schemas.microsoft.com/office/drawing/2014/main" id="{0428FE2F-E891-DA22-5C4F-1A441D096402}"/>
+          <p:cNvPr id="7" name="Segnaposto contenuto 6" descr="Immagine che contiene testo, schermata, Carattere, diagramma&#10;&#10;Descrizione generata automaticamente">
+            <a:extLst>
+              <a:ext uri="{FF2B5EF4-FFF2-40B4-BE49-F238E27FC236}">
+                <a16:creationId xmlns:a16="http://schemas.microsoft.com/office/drawing/2014/main" id="{9A4833E0-73FC-A687-7F98-6E5756454498}"/>
               </a:ext>
             </a:extLst>
           </p:cNvPr>
@@ -6683,13 +6683,13 @@
               </a:ext>
             </a:extLst>
           </a:blip>
-          <a:srcRect b="3071"/>
+          <a:srcRect b="3335"/>
           <a:stretch/>
         </p:blipFill>
         <p:spPr>
           <a:xfrm>
             <a:off x="6068325" y="0"/>
-            <a:ext cx="3096598" cy="6858000"/>
+            <a:ext cx="3098910" cy="6858000"/>
           </a:xfrm>
         </p:spPr>
       </p:pic>

</xml_diff>

<commit_message>
prova immagini da galleria
</commit_message>
<xml_diff>
--- a/mockup/OUTDOORROMAGNA.pptx
+++ b/mockup/OUTDOORROMAGNA.pptx
@@ -5238,7 +5238,7 @@
         </p:spPr>
         <p:txBody>
           <a:bodyPr>
-            <a:normAutofit fontScale="92500" lnSpcReduction="10000"/>
+            <a:normAutofit fontScale="85000" lnSpcReduction="20000"/>
           </a:bodyPr>
           <a:lstStyle/>
           <a:p>
@@ -5270,7 +5270,7 @@
             </a:r>
             <a:r>
               <a:rPr lang="it-IT" dirty="0"/>
-              <a:t>: per la creazione e la gestione del database in locale</a:t>
+              <a:t>: per gestione del database in locale</a:t>
             </a:r>
           </a:p>
           <a:p>
@@ -5284,7 +5284,7 @@
             </a:r>
             <a:r>
               <a:rPr lang="it-IT" dirty="0"/>
-              <a:t>: per salvare le impostazioni</a:t>
+              <a:t>: per salvare le impostazioni utente</a:t>
             </a:r>
           </a:p>
           <a:p>
@@ -5298,7 +5298,7 @@
             </a:r>
             <a:r>
               <a:rPr lang="it-IT" dirty="0"/>
-              <a:t>: utilizzo della camera per l'inserimento della foto profilo</a:t>
+              <a:t>: per l'inserimento della foto profilo</a:t>
             </a:r>
           </a:p>
           <a:p>
@@ -5358,11 +5358,29 @@
               <a:rPr lang="it-IT" dirty="0"/>
               <a:t>, Coil</a:t>
             </a:r>
-            <a:r>
-              <a:rPr lang="it-IT"/>
-              <a:t>, </a:t>
-            </a:r>
-            <a:endParaRPr lang="it-IT" dirty="0"/>
+          </a:p>
+          <a:p>
+            <a:pPr marL="457200" indent="-457200" algn="just">
+              <a:buFont typeface="Wingdings" panose="05000000000000000000" pitchFamily="2" charset="2"/>
+              <a:buChar char="Ø"/>
+            </a:pPr>
+            <a:r>
+              <a:rPr lang="it-IT" b="1" dirty="0" err="1"/>
+              <a:t>Figma</a:t>
+            </a:r>
+            <a:r>
+              <a:rPr lang="it-IT" b="1" dirty="0"/>
+              <a:t>: </a:t>
+            </a:r>
+            <a:r>
+              <a:rPr lang="it-IT" dirty="0"/>
+              <a:t>per la creazione dei </a:t>
+            </a:r>
+            <a:r>
+              <a:rPr lang="it-IT" dirty="0" err="1"/>
+              <a:t>mockup</a:t>
+            </a:r>
+            <a:endParaRPr lang="it-IT" b="1" dirty="0"/>
           </a:p>
         </p:txBody>
       </p:sp>

</xml_diff>